<commit_message>
lecture5 ppt and code
</commit_message>
<xml_diff>
--- a/MSANDE228_Lecture5_Inference_in_High_Dimensional_Linear_Models.pptx
+++ b/MSANDE228_Lecture5_Inference_in_High_Dimensional_Linear_Models.pptx
@@ -12379,8 +12379,8 @@
           </a:p>
         </p:txBody>
       </p:sp>
-      <mc:AlternateContent xmlns:mc="http://schemas.openxmlformats.org/markup-compatibility/2006">
-        <mc:Choice xmlns:a14="http://schemas.microsoft.com/office/drawing/2010/main" Requires="a14">
+      <mc:AlternateContent xmlns:mc="http://schemas.openxmlformats.org/markup-compatibility/2006" xmlns:a14="http://schemas.microsoft.com/office/drawing/2010/main">
+        <mc:Choice Requires="a14">
           <p:sp>
             <p:nvSpPr>
               <p:cNvPr id="3" name="Content Placeholder 2">
@@ -13346,7 +13346,7 @@
             </p:txBody>
           </p:sp>
         </mc:Choice>
-        <mc:Fallback>
+        <mc:Fallback xmlns="">
           <p:sp>
             <p:nvSpPr>
               <p:cNvPr id="3" name="Content Placeholder 2">
@@ -15438,8 +15438,8 @@
           </a:p>
         </p:txBody>
       </p:sp>
-      <mc:AlternateContent xmlns:mc="http://schemas.openxmlformats.org/markup-compatibility/2006">
-        <mc:Choice xmlns:a14="http://schemas.microsoft.com/office/drawing/2010/main" Requires="a14">
+      <mc:AlternateContent xmlns:mc="http://schemas.openxmlformats.org/markup-compatibility/2006" xmlns:a14="http://schemas.microsoft.com/office/drawing/2010/main">
+        <mc:Choice Requires="a14">
           <p:sp>
             <p:nvSpPr>
               <p:cNvPr id="3" name="Content Placeholder 2">
@@ -16192,7 +16192,7 @@
             </p:txBody>
           </p:sp>
         </mc:Choice>
-        <mc:Fallback>
+        <mc:Fallback xmlns="">
           <p:sp>
             <p:nvSpPr>
               <p:cNvPr id="3" name="Content Placeholder 2">
@@ -16480,8 +16480,8 @@
           </a:p>
         </p:txBody>
       </p:sp>
-      <mc:AlternateContent xmlns:mc="http://schemas.openxmlformats.org/markup-compatibility/2006">
-        <mc:Choice xmlns:a14="http://schemas.microsoft.com/office/drawing/2010/main" Requires="a14">
+      <mc:AlternateContent xmlns:mc="http://schemas.openxmlformats.org/markup-compatibility/2006" xmlns:a14="http://schemas.microsoft.com/office/drawing/2010/main">
+        <mc:Choice Requires="a14">
           <p:sp>
             <p:nvSpPr>
               <p:cNvPr id="3" name="Content Placeholder 2">
@@ -17058,7 +17058,7 @@
             </p:txBody>
           </p:sp>
         </mc:Choice>
-        <mc:Fallback>
+        <mc:Fallback xmlns="">
           <p:sp>
             <p:nvSpPr>
               <p:cNvPr id="3" name="Content Placeholder 2">
@@ -17670,8 +17670,8 @@
           </a:p>
         </p:txBody>
       </p:sp>
-      <mc:AlternateContent xmlns:mc="http://schemas.openxmlformats.org/markup-compatibility/2006">
-        <mc:Choice xmlns:a14="http://schemas.microsoft.com/office/drawing/2010/main" Requires="a14">
+      <mc:AlternateContent xmlns:mc="http://schemas.openxmlformats.org/markup-compatibility/2006" xmlns:a14="http://schemas.microsoft.com/office/drawing/2010/main">
+        <mc:Choice Requires="a14">
           <p:sp>
             <p:nvSpPr>
               <p:cNvPr id="3" name="Content Placeholder 2">
@@ -18258,7 +18258,7 @@
             </p:txBody>
           </p:sp>
         </mc:Choice>
-        <mc:Fallback>
+        <mc:Fallback xmlns="">
           <p:sp>
             <p:nvSpPr>
               <p:cNvPr id="3" name="Content Placeholder 2">
@@ -19902,8 +19902,8 @@
           <a:chExt cx="0" cy="0"/>
         </a:xfrm>
       </p:grpSpPr>
-      <mc:AlternateContent xmlns:mc="http://schemas.openxmlformats.org/markup-compatibility/2006">
-        <mc:Choice xmlns:a14="http://schemas.microsoft.com/office/drawing/2010/main" Requires="a14">
+      <mc:AlternateContent xmlns:mc="http://schemas.openxmlformats.org/markup-compatibility/2006" xmlns:a14="http://schemas.microsoft.com/office/drawing/2010/main">
+        <mc:Choice Requires="a14">
           <p:sp>
             <p:nvSpPr>
               <p:cNvPr id="2" name="Title 1">
@@ -20303,7 +20303,7 @@
             </p:txBody>
           </p:sp>
         </mc:Choice>
-        <mc:Fallback>
+        <mc:Fallback xmlns="">
           <p:sp>
             <p:nvSpPr>
               <p:cNvPr id="2" name="Title 1">
@@ -20531,8 +20531,8 @@
           </a:p>
         </p:txBody>
       </p:sp>
-      <mc:AlternateContent xmlns:mc="http://schemas.openxmlformats.org/markup-compatibility/2006">
-        <mc:Choice xmlns:a14="http://schemas.microsoft.com/office/drawing/2010/main" Requires="a14">
+      <mc:AlternateContent xmlns:mc="http://schemas.openxmlformats.org/markup-compatibility/2006" xmlns:a14="http://schemas.microsoft.com/office/drawing/2010/main">
+        <mc:Choice Requires="a14">
           <p:sp>
             <p:nvSpPr>
               <p:cNvPr id="3" name="Content Placeholder 2">
@@ -21073,7 +21073,7 @@
             </p:txBody>
           </p:sp>
         </mc:Choice>
-        <mc:Fallback>
+        <mc:Fallback xmlns="">
           <p:sp>
             <p:nvSpPr>
               <p:cNvPr id="3" name="Content Placeholder 2">
@@ -21984,8 +21984,8 @@
           </a:p>
         </p:txBody>
       </p:sp>
-      <mc:AlternateContent xmlns:mc="http://schemas.openxmlformats.org/markup-compatibility/2006">
-        <mc:Choice xmlns:a14="http://schemas.microsoft.com/office/drawing/2010/main" Requires="a14">
+      <mc:AlternateContent xmlns:mc="http://schemas.openxmlformats.org/markup-compatibility/2006" xmlns:a14="http://schemas.microsoft.com/office/drawing/2010/main">
+        <mc:Choice Requires="a14">
           <p:sp>
             <p:nvSpPr>
               <p:cNvPr id="3" name="Content Placeholder 2">
@@ -22341,7 +22341,7 @@
             </p:txBody>
           </p:sp>
         </mc:Choice>
-        <mc:Fallback>
+        <mc:Fallback xmlns="">
           <p:sp>
             <p:nvSpPr>
               <p:cNvPr id="3" name="Content Placeholder 2">
@@ -24567,7 +24567,7 @@
                   <a:rPr lang="en-US" dirty="0">
                     <a:latin typeface="+mj-lt"/>
                   </a:rPr>
-                  <a:t>, the estimation error </a:t>
+                  <a:t>, and the Restrict Isometry Property holds, the estimation error </a:t>
                 </a:r>
                 <a14:m>
                   <m:oMath xmlns:m="http://schemas.openxmlformats.org/officeDocument/2006/math">
@@ -25488,8 +25488,8 @@
           </a:p>
         </p:txBody>
       </p:sp>
-      <mc:AlternateContent xmlns:mc="http://schemas.openxmlformats.org/markup-compatibility/2006">
-        <mc:Choice xmlns:a14="http://schemas.microsoft.com/office/drawing/2010/main" Requires="a14">
+      <mc:AlternateContent xmlns:mc="http://schemas.openxmlformats.org/markup-compatibility/2006" xmlns:a14="http://schemas.microsoft.com/office/drawing/2010/main">
+        <mc:Choice Requires="a14">
           <p:sp>
             <p:nvSpPr>
               <p:cNvPr id="3" name="Content Placeholder 2">
@@ -26854,7 +26854,7 @@
             </p:txBody>
           </p:sp>
         </mc:Choice>
-        <mc:Fallback>
+        <mc:Fallback xmlns="">
           <p:sp>
             <p:nvSpPr>
               <p:cNvPr id="3" name="Content Placeholder 2">
@@ -27114,8 +27114,8 @@
           <a:chExt cx="0" cy="0"/>
         </a:xfrm>
       </p:grpSpPr>
-      <mc:AlternateContent xmlns:mc="http://schemas.openxmlformats.org/markup-compatibility/2006">
-        <mc:Choice xmlns:a14="http://schemas.microsoft.com/office/drawing/2010/main" Requires="a14">
+      <mc:AlternateContent xmlns:mc="http://schemas.openxmlformats.org/markup-compatibility/2006" xmlns:a14="http://schemas.microsoft.com/office/drawing/2010/main">
+        <mc:Choice Requires="a14">
           <p:sp>
             <p:nvSpPr>
               <p:cNvPr id="2" name="Title 1">
@@ -27298,7 +27298,7 @@
                       <m:d>
                         <m:dPr>
                           <m:ctrlPr>
-                            <a:rPr lang="en-US" sz="2800" b="0" i="0" smtClean="0">
+                            <a:rPr lang="en-US" sz="2800" b="0" i="1" smtClean="0">
                               <a:latin typeface="Cambria Math" panose="02040503050406030204" pitchFamily="18" charset="0"/>
                             </a:rPr>
                           </m:ctrlPr>
@@ -27509,7 +27509,7 @@
             </p:txBody>
           </p:sp>
         </mc:Choice>
-        <mc:Fallback>
+        <mc:Fallback xmlns="">
           <p:sp>
             <p:nvSpPr>
               <p:cNvPr id="2" name="Title 1">

</xml_diff>